<commit_message>
update plot font x patch PIMS plot x rerun the code
</commit_message>
<xml_diff>
--- a/1_analysis/manual_plot/技术路线图.pptx
+++ b/1_analysis/manual_plot/技术路线图.pptx
@@ -218,7 +218,7 @@
           <a:p>
             <a:fld id="{C41A71DD-165A-D04A-985F-67D53D8471B4}" type="datetimeFigureOut">
               <a:rPr kumimoji="1" lang="zh-CN" altLang="en-US" smtClean="0"/>
-              <a:t>2025/7/13</a:t>
+              <a:t>2025/8/2</a:t>
             </a:fld>
             <a:endParaRPr kumimoji="1" lang="zh-CN" altLang="en-US"/>
           </a:p>
@@ -700,7 +700,7 @@
           <a:p>
             <a:fld id="{42E30718-B82E-6449-BD04-ABC77837E66B}" type="datetimeFigureOut">
               <a:rPr kumimoji="1" lang="zh-CN" altLang="en-US" smtClean="0"/>
-              <a:t>2025/7/13</a:t>
+              <a:t>2025/8/2</a:t>
             </a:fld>
             <a:endParaRPr kumimoji="1" lang="zh-CN" altLang="en-US"/>
           </a:p>
@@ -870,7 +870,7 @@
           <a:p>
             <a:fld id="{42E30718-B82E-6449-BD04-ABC77837E66B}" type="datetimeFigureOut">
               <a:rPr kumimoji="1" lang="zh-CN" altLang="en-US" smtClean="0"/>
-              <a:t>2025/7/13</a:t>
+              <a:t>2025/8/2</a:t>
             </a:fld>
             <a:endParaRPr kumimoji="1" lang="zh-CN" altLang="en-US"/>
           </a:p>
@@ -1050,7 +1050,7 @@
           <a:p>
             <a:fld id="{42E30718-B82E-6449-BD04-ABC77837E66B}" type="datetimeFigureOut">
               <a:rPr kumimoji="1" lang="zh-CN" altLang="en-US" smtClean="0"/>
-              <a:t>2025/7/13</a:t>
+              <a:t>2025/8/2</a:t>
             </a:fld>
             <a:endParaRPr kumimoji="1" lang="zh-CN" altLang="en-US"/>
           </a:p>
@@ -1220,7 +1220,7 @@
           <a:p>
             <a:fld id="{42E30718-B82E-6449-BD04-ABC77837E66B}" type="datetimeFigureOut">
               <a:rPr kumimoji="1" lang="zh-CN" altLang="en-US" smtClean="0"/>
-              <a:t>2025/7/13</a:t>
+              <a:t>2025/8/2</a:t>
             </a:fld>
             <a:endParaRPr kumimoji="1" lang="zh-CN" altLang="en-US"/>
           </a:p>
@@ -1466,7 +1466,7 @@
           <a:p>
             <a:fld id="{42E30718-B82E-6449-BD04-ABC77837E66B}" type="datetimeFigureOut">
               <a:rPr kumimoji="1" lang="zh-CN" altLang="en-US" smtClean="0"/>
-              <a:t>2025/7/13</a:t>
+              <a:t>2025/8/2</a:t>
             </a:fld>
             <a:endParaRPr kumimoji="1" lang="zh-CN" altLang="en-US"/>
           </a:p>
@@ -1698,7 +1698,7 @@
           <a:p>
             <a:fld id="{42E30718-B82E-6449-BD04-ABC77837E66B}" type="datetimeFigureOut">
               <a:rPr kumimoji="1" lang="zh-CN" altLang="en-US" smtClean="0"/>
-              <a:t>2025/7/13</a:t>
+              <a:t>2025/8/2</a:t>
             </a:fld>
             <a:endParaRPr kumimoji="1" lang="zh-CN" altLang="en-US"/>
           </a:p>
@@ -2065,7 +2065,7 @@
           <a:p>
             <a:fld id="{42E30718-B82E-6449-BD04-ABC77837E66B}" type="datetimeFigureOut">
               <a:rPr kumimoji="1" lang="zh-CN" altLang="en-US" smtClean="0"/>
-              <a:t>2025/7/13</a:t>
+              <a:t>2025/8/2</a:t>
             </a:fld>
             <a:endParaRPr kumimoji="1" lang="zh-CN" altLang="en-US"/>
           </a:p>
@@ -2183,7 +2183,7 @@
           <a:p>
             <a:fld id="{42E30718-B82E-6449-BD04-ABC77837E66B}" type="datetimeFigureOut">
               <a:rPr kumimoji="1" lang="zh-CN" altLang="en-US" smtClean="0"/>
-              <a:t>2025/7/13</a:t>
+              <a:t>2025/8/2</a:t>
             </a:fld>
             <a:endParaRPr kumimoji="1" lang="zh-CN" altLang="en-US"/>
           </a:p>
@@ -2278,7 +2278,7 @@
           <a:p>
             <a:fld id="{42E30718-B82E-6449-BD04-ABC77837E66B}" type="datetimeFigureOut">
               <a:rPr kumimoji="1" lang="zh-CN" altLang="en-US" smtClean="0"/>
-              <a:t>2025/7/13</a:t>
+              <a:t>2025/8/2</a:t>
             </a:fld>
             <a:endParaRPr kumimoji="1" lang="zh-CN" altLang="en-US"/>
           </a:p>
@@ -2555,7 +2555,7 @@
           <a:p>
             <a:fld id="{42E30718-B82E-6449-BD04-ABC77837E66B}" type="datetimeFigureOut">
               <a:rPr kumimoji="1" lang="zh-CN" altLang="en-US" smtClean="0"/>
-              <a:t>2025/7/13</a:t>
+              <a:t>2025/8/2</a:t>
             </a:fld>
             <a:endParaRPr kumimoji="1" lang="zh-CN" altLang="en-US"/>
           </a:p>
@@ -2812,7 +2812,7 @@
           <a:p>
             <a:fld id="{42E30718-B82E-6449-BD04-ABC77837E66B}" type="datetimeFigureOut">
               <a:rPr kumimoji="1" lang="zh-CN" altLang="en-US" smtClean="0"/>
-              <a:t>2025/7/13</a:t>
+              <a:t>2025/8/2</a:t>
             </a:fld>
             <a:endParaRPr kumimoji="1" lang="zh-CN" altLang="en-US"/>
           </a:p>
@@ -3025,7 +3025,7 @@
           <a:p>
             <a:fld id="{42E30718-B82E-6449-BD04-ABC77837E66B}" type="datetimeFigureOut">
               <a:rPr kumimoji="1" lang="zh-CN" altLang="en-US" smtClean="0"/>
-              <a:t>2025/7/13</a:t>
+              <a:t>2025/8/2</a:t>
             </a:fld>
             <a:endParaRPr kumimoji="1" lang="zh-CN" altLang="en-US"/>
           </a:p>
@@ -4634,7 +4634,7 @@
           </p:nvSpPr>
           <p:spPr>
             <a:xfrm>
-              <a:off x="5214626" y="10731309"/>
+              <a:off x="7250238" y="10706795"/>
               <a:ext cx="1029822" cy="830997"/>
             </a:xfrm>
             <a:prstGeom prst="rect">
@@ -4678,7 +4678,7 @@
           </p:nvSpPr>
           <p:spPr>
             <a:xfrm>
-              <a:off x="7356684" y="10745563"/>
+              <a:off x="5285979" y="10725242"/>
               <a:ext cx="1029822" cy="830997"/>
             </a:xfrm>
             <a:prstGeom prst="rect">
@@ -4705,48 +4705,6 @@
                 </a:rPr>
                 <a:t>政府角色</a:t>
               </a:r>
-            </a:p>
-          </p:txBody>
-        </p:sp>
-        <p:sp>
-          <p:nvSpPr>
-            <p:cNvPr id="38" name="＋">
-              <a:extLst>
-                <a:ext uri="{FF2B5EF4-FFF2-40B4-BE49-F238E27FC236}">
-                  <a16:creationId xmlns:a16="http://schemas.microsoft.com/office/drawing/2014/main" id="{3B92A963-2886-D53A-A76D-0EC9BA8E8C02}"/>
-                </a:ext>
-              </a:extLst>
-            </p:cNvPr>
-            <p:cNvSpPr txBox="1"/>
-            <p:nvPr/>
-          </p:nvSpPr>
-          <p:spPr>
-            <a:xfrm>
-              <a:off x="6417339" y="10546642"/>
-              <a:ext cx="663964" cy="1200329"/>
-            </a:xfrm>
-            <a:prstGeom prst="rect">
-              <a:avLst/>
-            </a:prstGeom>
-            <a:noFill/>
-          </p:spPr>
-          <p:txBody>
-            <a:bodyPr wrap="none" rtlCol="0">
-              <a:spAutoFit/>
-            </a:bodyPr>
-            <a:lstStyle/>
-            <a:p>
-              <a:r>
-                <a:rPr kumimoji="1" lang="en-US" altLang="zh-CN" sz="7200" b="1" dirty="0">
-                  <a:latin typeface="SimHei" panose="02010609060101010101" pitchFamily="49" charset="-122"/>
-                  <a:ea typeface="SimHei" panose="02010609060101010101" pitchFamily="49" charset="-122"/>
-                </a:rPr>
-                <a:t>+</a:t>
-              </a:r>
-              <a:endParaRPr kumimoji="1" lang="zh-CN" altLang="en-US" sz="7200" b="1" dirty="0">
-                <a:latin typeface="SimHei" panose="02010609060101010101" pitchFamily="49" charset="-122"/>
-                <a:ea typeface="SimHei" panose="02010609060101010101" pitchFamily="49" charset="-122"/>
-              </a:endParaRPr>
             </a:p>
           </p:txBody>
         </p:sp>
@@ -6847,6 +6805,54 @@
           </p:txBody>
         </p:sp>
       </p:grpSp>
+      <p:cxnSp>
+        <p:nvCxnSpPr>
+          <p:cNvPr id="5" name="直线连接符 4">
+            <a:extLst>
+              <a:ext uri="{FF2B5EF4-FFF2-40B4-BE49-F238E27FC236}">
+                <a16:creationId xmlns:a16="http://schemas.microsoft.com/office/drawing/2014/main" id="{459B7382-CE62-A441-95E5-9F05150A7BAD}"/>
+              </a:ext>
+            </a:extLst>
+          </p:cNvPr>
+          <p:cNvCxnSpPr>
+            <a:cxnSpLocks/>
+            <a:stCxn id="36" idx="3"/>
+            <a:endCxn id="35" idx="1"/>
+          </p:cNvCxnSpPr>
+          <p:nvPr/>
+        </p:nvCxnSpPr>
+        <p:spPr>
+          <a:xfrm flipV="1">
+            <a:off x="6315801" y="11122294"/>
+            <a:ext cx="934437" cy="18447"/>
+          </a:xfrm>
+          <a:prstGeom prst="line">
+            <a:avLst/>
+          </a:prstGeom>
+          <a:ln w="38100">
+            <a:solidFill>
+              <a:schemeClr val="bg1">
+                <a:lumMod val="50000"/>
+              </a:schemeClr>
+            </a:solidFill>
+            <a:prstDash val="dash"/>
+          </a:ln>
+        </p:spPr>
+        <p:style>
+          <a:lnRef idx="2">
+            <a:schemeClr val="accent1"/>
+          </a:lnRef>
+          <a:fillRef idx="0">
+            <a:schemeClr val="accent1"/>
+          </a:fillRef>
+          <a:effectRef idx="1">
+            <a:schemeClr val="accent1"/>
+          </a:effectRef>
+          <a:fontRef idx="minor">
+            <a:schemeClr val="tx1"/>
+          </a:fontRef>
+        </p:style>
+      </p:cxnSp>
     </p:spTree>
     <p:extLst>
       <p:ext uri="{BB962C8B-B14F-4D97-AF65-F5344CB8AC3E}">

</xml_diff>